<commit_message>
added our slide with codes
</commit_message>
<xml_diff>
--- a/plp_ohdsi_24_workgroup.pptx
+++ b/plp_ohdsi_24_workgroup.pptx
@@ -10,6 +10,7 @@
     <p:sldId id="257" r:id="rId4"/>
     <p:sldId id="259" r:id="rId5"/>
     <p:sldId id="260" r:id="rId6"/>
+    <p:sldId id="261" r:id="rId7"/>
   </p:sldIdLst>
   <p:sldSz cx="12192000" cy="6858000"/>
   <p:notesSz cx="6858000" cy="9144000"/>
@@ -108,6 +109,11 @@
       </a:defRPr>
     </a:lvl9pPr>
   </p:defaultTextStyle>
+  <p:extLst>
+    <p:ext uri="{EFAFB233-063F-42B5-8137-9DF3F51BA10A}">
+      <p15:sldGuideLst xmlns:p15="http://schemas.microsoft.com/office/powerpoint/2012/main"/>
+    </p:ext>
+  </p:extLst>
 </p:presentation>
 </file>
 
@@ -258,7 +264,7 @@
           <a:p>
             <a:fld id="{7B3D0F04-2ECC-B043-9326-F21ADCBE701D}" type="datetimeFigureOut">
               <a:rPr lang="en-US" smtClean="0"/>
-              <a:t>10/18/24</a:t>
+              <a:t>10/24/2024</a:t>
             </a:fld>
             <a:endParaRPr lang="en-US"/>
           </a:p>
@@ -456,7 +462,7 @@
           <a:p>
             <a:fld id="{7B3D0F04-2ECC-B043-9326-F21ADCBE701D}" type="datetimeFigureOut">
               <a:rPr lang="en-US" smtClean="0"/>
-              <a:t>10/18/24</a:t>
+              <a:t>10/24/2024</a:t>
             </a:fld>
             <a:endParaRPr lang="en-US"/>
           </a:p>
@@ -664,7 +670,7 @@
           <a:p>
             <a:fld id="{7B3D0F04-2ECC-B043-9326-F21ADCBE701D}" type="datetimeFigureOut">
               <a:rPr lang="en-US" smtClean="0"/>
-              <a:t>10/18/24</a:t>
+              <a:t>10/24/2024</a:t>
             </a:fld>
             <a:endParaRPr lang="en-US"/>
           </a:p>
@@ -862,7 +868,7 @@
           <a:p>
             <a:fld id="{7B3D0F04-2ECC-B043-9326-F21ADCBE701D}" type="datetimeFigureOut">
               <a:rPr lang="en-US" smtClean="0"/>
-              <a:t>10/18/24</a:t>
+              <a:t>10/24/2024</a:t>
             </a:fld>
             <a:endParaRPr lang="en-US"/>
           </a:p>
@@ -1137,7 +1143,7 @@
           <a:p>
             <a:fld id="{7B3D0F04-2ECC-B043-9326-F21ADCBE701D}" type="datetimeFigureOut">
               <a:rPr lang="en-US" smtClean="0"/>
-              <a:t>10/18/24</a:t>
+              <a:t>10/24/2024</a:t>
             </a:fld>
             <a:endParaRPr lang="en-US"/>
           </a:p>
@@ -1402,7 +1408,7 @@
           <a:p>
             <a:fld id="{7B3D0F04-2ECC-B043-9326-F21ADCBE701D}" type="datetimeFigureOut">
               <a:rPr lang="en-US" smtClean="0"/>
-              <a:t>10/18/24</a:t>
+              <a:t>10/24/2024</a:t>
             </a:fld>
             <a:endParaRPr lang="en-US"/>
           </a:p>
@@ -1814,7 +1820,7 @@
           <a:p>
             <a:fld id="{7B3D0F04-2ECC-B043-9326-F21ADCBE701D}" type="datetimeFigureOut">
               <a:rPr lang="en-US" smtClean="0"/>
-              <a:t>10/18/24</a:t>
+              <a:t>10/24/2024</a:t>
             </a:fld>
             <a:endParaRPr lang="en-US"/>
           </a:p>
@@ -1955,7 +1961,7 @@
           <a:p>
             <a:fld id="{7B3D0F04-2ECC-B043-9326-F21ADCBE701D}" type="datetimeFigureOut">
               <a:rPr lang="en-US" smtClean="0"/>
-              <a:t>10/18/24</a:t>
+              <a:t>10/24/2024</a:t>
             </a:fld>
             <a:endParaRPr lang="en-US"/>
           </a:p>
@@ -2068,7 +2074,7 @@
           <a:p>
             <a:fld id="{7B3D0F04-2ECC-B043-9326-F21ADCBE701D}" type="datetimeFigureOut">
               <a:rPr lang="en-US" smtClean="0"/>
-              <a:t>10/18/24</a:t>
+              <a:t>10/24/2024</a:t>
             </a:fld>
             <a:endParaRPr lang="en-US"/>
           </a:p>
@@ -2379,7 +2385,7 @@
           <a:p>
             <a:fld id="{7B3D0F04-2ECC-B043-9326-F21ADCBE701D}" type="datetimeFigureOut">
               <a:rPr lang="en-US" smtClean="0"/>
-              <a:t>10/18/24</a:t>
+              <a:t>10/24/2024</a:t>
             </a:fld>
             <a:endParaRPr lang="en-US"/>
           </a:p>
@@ -2667,7 +2673,7 @@
           <a:p>
             <a:fld id="{7B3D0F04-2ECC-B043-9326-F21ADCBE701D}" type="datetimeFigureOut">
               <a:rPr lang="en-US" smtClean="0"/>
-              <a:t>10/18/24</a:t>
+              <a:t>10/24/2024</a:t>
             </a:fld>
             <a:endParaRPr lang="en-US"/>
           </a:p>
@@ -2908,7 +2914,7 @@
           <a:p>
             <a:fld id="{7B3D0F04-2ECC-B043-9326-F21ADCBE701D}" type="datetimeFigureOut">
               <a:rPr lang="en-US" smtClean="0"/>
-              <a:t>10/18/24</a:t>
+              <a:t>10/24/2024</a:t>
             </a:fld>
             <a:endParaRPr lang="en-US"/>
           </a:p>
@@ -3461,7 +3467,7 @@
         </p:nvGraphicFramePr>
         <p:xfrm>
           <a:off x="718456" y="1525209"/>
-          <a:ext cx="10515600" cy="4150360"/>
+          <a:ext cx="10515600" cy="4963160"/>
         </p:xfrm>
         <a:graphic>
           <a:graphicData uri="http://schemas.openxmlformats.org/drawingml/2006/table">
@@ -3978,7 +3984,7 @@
         <p:spPr/>
         <p:txBody>
           <a:bodyPr>
-            <a:normAutofit lnSpcReduction="10000"/>
+            <a:normAutofit fontScale="92500" lnSpcReduction="20000"/>
           </a:bodyPr>
           <a:lstStyle/>
           <a:p>
@@ -4289,8 +4295,8 @@
         </p:nvSpPr>
         <p:spPr>
           <a:xfrm>
-            <a:off x="3037113" y="1585904"/>
-            <a:ext cx="2177143" cy="1513114"/>
+            <a:off x="3037113" y="1585903"/>
+            <a:ext cx="5859237" cy="3471871"/>
           </a:xfrm>
           <a:prstGeom prst="roundRect">
             <a:avLst/>
@@ -4323,7 +4329,7 @@
             </a:r>
           </a:p>
           <a:p>
-            <a:pPr algn="ctr"/>
+            <a:pPr lvl="1" algn="ctr"/>
             <a:r>
               <a:rPr lang="en-US" sz="1200" dirty="0"/>
               <a:t>Age/end stage kidney disease/ stage 4 pressure injury/COPD/peripheral vascular disease/failure to thrive/malnutrition</a:t>
@@ -4629,6 +4635,211 @@
     <p:extLst>
       <p:ext uri="{BB962C8B-B14F-4D97-AF65-F5344CB8AC3E}">
         <p14:creationId xmlns:p14="http://schemas.microsoft.com/office/powerpoint/2010/main" val="3542597312"/>
+      </p:ext>
+    </p:extLst>
+  </p:cSld>
+  <p:clrMapOvr>
+    <a:masterClrMapping/>
+  </p:clrMapOvr>
+</p:sld>
+</file>
+
+<file path=ppt/slides/slide6.xml><?xml version="1.0" encoding="utf-8"?>
+<p:sld xmlns:a="http://schemas.openxmlformats.org/drawingml/2006/main" xmlns:r="http://schemas.openxmlformats.org/officeDocument/2006/relationships" xmlns:p="http://schemas.openxmlformats.org/presentationml/2006/main">
+  <p:cSld>
+    <p:spTree>
+      <p:nvGrpSpPr>
+        <p:cNvPr id="1" name=""/>
+        <p:cNvGrpSpPr/>
+        <p:nvPr/>
+      </p:nvGrpSpPr>
+      <p:grpSpPr>
+        <a:xfrm>
+          <a:off x="0" y="0"/>
+          <a:ext cx="0" cy="0"/>
+          <a:chOff x="0" y="0"/>
+          <a:chExt cx="0" cy="0"/>
+        </a:xfrm>
+      </p:grpSpPr>
+      <p:sp>
+        <p:nvSpPr>
+          <p:cNvPr id="2" name="Title 1"/>
+          <p:cNvSpPr>
+            <a:spLocks noGrp="1"/>
+          </p:cNvSpPr>
+          <p:nvPr>
+            <p:ph type="title"/>
+          </p:nvPr>
+        </p:nvSpPr>
+        <p:spPr/>
+        <p:txBody>
+          <a:bodyPr>
+            <a:normAutofit fontScale="90000"/>
+          </a:bodyPr>
+          <a:lstStyle/>
+          <a:p>
+            <a:r>
+              <a:rPr lang="en-US" dirty="0" smtClean="0"/>
+              <a:t>Clinician Identified Risk Factors Defined as Cohorts (</a:t>
+            </a:r>
+            <a:r>
+              <a:rPr lang="en-US" dirty="0" err="1" smtClean="0"/>
+              <a:t>getcohorts</a:t>
+            </a:r>
+            <a:r>
+              <a:rPr lang="en-US" dirty="0" smtClean="0"/>
+              <a:t> from atlas)</a:t>
+            </a:r>
+            <a:endParaRPr lang="en-US" dirty="0"/>
+          </a:p>
+        </p:txBody>
+      </p:sp>
+      <p:sp>
+        <p:nvSpPr>
+          <p:cNvPr id="3" name="Content Placeholder 2"/>
+          <p:cNvSpPr>
+            <a:spLocks noGrp="1"/>
+          </p:cNvSpPr>
+          <p:nvPr>
+            <p:ph idx="1"/>
+          </p:nvPr>
+        </p:nvSpPr>
+        <p:spPr/>
+        <p:txBody>
+          <a:bodyPr>
+            <a:normAutofit fontScale="85000" lnSpcReduction="20000"/>
+          </a:bodyPr>
+          <a:lstStyle/>
+          <a:p>
+            <a:r>
+              <a:rPr lang="en-US" dirty="0" smtClean="0"/>
+              <a:t>Age (standard not needed)</a:t>
+            </a:r>
+          </a:p>
+          <a:p>
+            <a:r>
+              <a:rPr lang="en-US" dirty="0" smtClean="0"/>
+              <a:t>end </a:t>
+            </a:r>
+            <a:r>
+              <a:rPr lang="en-US" dirty="0"/>
+              <a:t>stage kidney disease (https://</a:t>
+            </a:r>
+            <a:r>
+              <a:rPr lang="en-US" dirty="0" smtClean="0"/>
+              <a:t>atlas-demo.ohdsi.org/WebAPI/cohortdefinition/1791148)</a:t>
+            </a:r>
+          </a:p>
+          <a:p>
+            <a:r>
+              <a:rPr lang="en-US" dirty="0" smtClean="0"/>
+              <a:t>stage </a:t>
+            </a:r>
+            <a:r>
+              <a:rPr lang="en-US" dirty="0"/>
+              <a:t>4 pressure </a:t>
+            </a:r>
+            <a:r>
+              <a:rPr lang="en-US" dirty="0" smtClean="0"/>
+              <a:t>injury (Public atlas concept id </a:t>
+            </a:r>
+            <a:r>
+              <a:rPr lang="en-US" dirty="0"/>
+              <a:t>1177310) </a:t>
+            </a:r>
+            <a:r>
+              <a:rPr lang="en-US" dirty="0">
+                <a:hlinkClick r:id="rId2"/>
+              </a:rPr>
+              <a:t>https://</a:t>
+            </a:r>
+            <a:r>
+              <a:rPr lang="en-US" dirty="0" smtClean="0">
+                <a:hlinkClick r:id="rId2"/>
+              </a:rPr>
+              <a:t>atlas-demo.ohdsi.org/WebAPI/cohortdefinition/1791143</a:t>
+            </a:r>
+            <a:endParaRPr lang="en-US" dirty="0" smtClean="0"/>
+          </a:p>
+          <a:p>
+            <a:r>
+              <a:rPr lang="en-US" dirty="0"/>
+              <a:t>COPD </a:t>
+            </a:r>
+            <a:r>
+              <a:rPr lang="en-US" dirty="0" smtClean="0"/>
+              <a:t>2106191 concept id </a:t>
+            </a:r>
+            <a:r>
+              <a:rPr lang="en-US" dirty="0" smtClean="0">
+                <a:hlinkClick r:id="rId3"/>
+              </a:rPr>
+              <a:t>https</a:t>
+            </a:r>
+            <a:r>
+              <a:rPr lang="en-US" dirty="0">
+                <a:hlinkClick r:id="rId3"/>
+              </a:rPr>
+              <a:t>://</a:t>
+            </a:r>
+            <a:r>
+              <a:rPr lang="en-US" dirty="0" smtClean="0">
+                <a:hlinkClick r:id="rId3"/>
+              </a:rPr>
+              <a:t>atlas-demo.ohdsi.org/WebAPI/cohortdefinition/1791144</a:t>
+            </a:r>
+            <a:endParaRPr lang="en-US" dirty="0" smtClean="0"/>
+          </a:p>
+          <a:p>
+            <a:r>
+              <a:rPr lang="en-US" dirty="0" smtClean="0"/>
+              <a:t>peripheral </a:t>
+            </a:r>
+            <a:r>
+              <a:rPr lang="en-US" dirty="0"/>
+              <a:t>vascular disease – concept ID 321052; https://atlas-demo.ohdsi.org/WebAPI/cohortdefinition/1791145</a:t>
+            </a:r>
+            <a:endParaRPr lang="en-US" dirty="0" smtClean="0"/>
+          </a:p>
+          <a:p>
+            <a:r>
+              <a:rPr lang="en-US" dirty="0" smtClean="0"/>
+              <a:t>failure </a:t>
+            </a:r>
+            <a:r>
+              <a:rPr lang="en-US" dirty="0"/>
+              <a:t>to </a:t>
+            </a:r>
+            <a:r>
+              <a:rPr lang="en-US" dirty="0" smtClean="0"/>
+              <a:t>thrive/malnutrition concept id  </a:t>
+            </a:r>
+            <a:r>
+              <a:rPr lang="en-US" dirty="0">
+                <a:hlinkClick r:id="rId4"/>
+              </a:rPr>
+              <a:t>https://</a:t>
+            </a:r>
+            <a:r>
+              <a:rPr lang="en-US" dirty="0" smtClean="0">
+                <a:hlinkClick r:id="rId4"/>
+              </a:rPr>
+              <a:t>atlas-demo.ohdsi.org/WebAPI/cohortdefinition/1791140</a:t>
+            </a:r>
+            <a:endParaRPr lang="en-US" dirty="0" smtClean="0"/>
+          </a:p>
+          <a:p>
+            <a:endParaRPr lang="en-US" dirty="0"/>
+          </a:p>
+          <a:p>
+            <a:endParaRPr lang="en-US" dirty="0"/>
+          </a:p>
+        </p:txBody>
+      </p:sp>
+    </p:spTree>
+    <p:extLst>
+      <p:ext uri="{BB962C8B-B14F-4D97-AF65-F5344CB8AC3E}">
+        <p14:creationId xmlns:p14="http://schemas.microsoft.com/office/powerpoint/2010/main" val="902948706"/>
       </p:ext>
     </p:extLst>
   </p:cSld>

</xml_diff>